<commit_message>
Correcting units in tracerutils presentation
</commit_message>
<xml_diff>
--- a/tracerutils_intro.pptx
+++ b/tracerutils_intro.pptx
@@ -1614,7 +1614,7 @@
         </p:nvSpPr>
         <p:spPr>
           <a:xfrm>
-            <a:off x="1143300" y="685800"/>
+            <a:off x="1143000" y="685800"/>
             <a:ext cx="4572000" cy="3429000"/>
           </a:xfrm>
           <a:custGeom>
@@ -12331,15 +12331,24 @@
               <a:buNone/>
             </a:pPr>
             <a:r>
-              <a:rPr lang="en-GB" b="1">
+              <a:rPr lang="en-GB" b="1" dirty="0" err="1">
                 <a:latin typeface="Courier New"/>
                 <a:ea typeface="Courier New"/>
                 <a:cs typeface="Courier New"/>
                 <a:sym typeface="Courier New"/>
               </a:rPr>
-              <a:t>check_duplicate_synapses(neuron)</a:t>
-            </a:r>
-            <a:endParaRPr b="1">
+              <a:t>check_duplicate_synapses</a:t>
+            </a:r>
+            <a:r>
+              <a:rPr lang="en-GB" b="1" dirty="0">
+                <a:latin typeface="Courier New"/>
+                <a:ea typeface="Courier New"/>
+                <a:cs typeface="Courier New"/>
+                <a:sym typeface="Courier New"/>
+              </a:rPr>
+              <a:t>(neuron)</a:t>
+            </a:r>
+            <a:endParaRPr b="1" dirty="0">
               <a:latin typeface="Courier New"/>
               <a:ea typeface="Courier New"/>
               <a:cs typeface="Courier New"/>
@@ -12356,7 +12365,7 @@
               </a:spcAft>
               <a:buNone/>
             </a:pPr>
-            <a:endParaRPr b="1">
+            <a:endParaRPr b="1" dirty="0">
               <a:solidFill>
                 <a:schemeClr val="dk2"/>
               </a:solidFill>
@@ -12377,15 +12386,31 @@
               <a:buNone/>
             </a:pPr>
             <a:r>
-              <a:rPr lang="en-GB">
+              <a:rPr lang="en-GB" dirty="0">
                 <a:solidFill>
                   <a:schemeClr val="dk2"/>
                 </a:solidFill>
               </a:rPr>
-              <a:t>It’s not uncommon for different tracers in CATMAID to accidentally mark a synapse twice.  Given a neuron or skeleton ID, this will look for connectors within adjustable distance thresholds (defaults to 200μm in X-Y or Z directions) that could be duplicates.  Returns a data frame (and optionally CSV) </a:t>
-            </a:r>
-            <a:r>
-              <a:rPr lang="en-GB">
+              <a:t>It’s not uncommon for different tracers in CATMAID to accidentally mark a synapse twice.  Given a neuron or skeleton ID, this will look for connectors within adjustable distance thresholds (defaults to </a:t>
+            </a:r>
+            <a:r>
+              <a:rPr lang="en-GB" dirty="0" smtClean="0">
+                <a:solidFill>
+                  <a:schemeClr val="dk2"/>
+                </a:solidFill>
+              </a:rPr>
+              <a:t>200nm </a:t>
+            </a:r>
+            <a:r>
+              <a:rPr lang="en-GB" dirty="0">
+                <a:solidFill>
+                  <a:schemeClr val="dk2"/>
+                </a:solidFill>
+              </a:rPr>
+              <a:t>in X-Y or Z directions) that could be duplicates.  Returns a data frame (and optionally CSV) </a:t>
+            </a:r>
+            <a:r>
+              <a:rPr lang="en-GB" dirty="0">
                 <a:solidFill>
                   <a:schemeClr val="dk2"/>
                 </a:solidFill>
@@ -12395,7 +12420,7 @@
               </a:rPr>
               <a:t>with IDs of the identified connector pairs, their distances, and URLs to the connectors in CATMAID.</a:t>
             </a:r>
-            <a:endParaRPr>
+            <a:endParaRPr dirty="0">
               <a:solidFill>
                 <a:schemeClr val="dk2"/>
               </a:solidFill>

</xml_diff>